<commit_message>
Description des modifications presentation
</commit_message>
<xml_diff>
--- a/Présentation_Medos.pptx
+++ b/Présentation_Medos.pptx
@@ -22377,66 +22377,6 @@
       </p:grpSpPr>
       <p:sp>
         <p:nvSpPr>
-          <p:cNvPr id="2" name="Titre 1">
-            <a:extLst>
-              <a:ext uri="{FF2B5EF4-FFF2-40B4-BE49-F238E27FC236}">
-                <a16:creationId xmlns:a16="http://schemas.microsoft.com/office/drawing/2014/main" id="{0A2741C2-2C2C-8F55-7166-C457FB998AAF}"/>
-              </a:ext>
-            </a:extLst>
-          </p:cNvPr>
-          <p:cNvSpPr>
-            <a:spLocks noGrp="1"/>
-          </p:cNvSpPr>
-          <p:nvPr>
-            <p:ph type="title"/>
-          </p:nvPr>
-        </p:nvSpPr>
-        <p:spPr>
-          <a:xfrm>
-            <a:off x="1693499" y="2766218"/>
-            <a:ext cx="9819628" cy="1431709"/>
-          </a:xfrm>
-        </p:spPr>
-        <p:txBody>
-          <a:bodyPr>
-            <a:normAutofit fontScale="90000"/>
-          </a:bodyPr>
-          <a:lstStyle/>
-          <a:p>
-            <a:r>
-              <a:rPr lang="fr-FR" sz="5800" b="1" dirty="0">
-                <a:solidFill>
-                  <a:srgbClr val="275C8D"/>
-                </a:solidFill>
-                <a:effectLst>
-                  <a:outerShdw blurRad="38100" dist="38100" dir="2700000" algn="tl">
-                    <a:srgbClr val="000000">
-                      <a:alpha val="43137"/>
-                    </a:srgbClr>
-                  </a:outerShdw>
-                </a:effectLst>
-                <a:latin typeface="Century Gothic" panose="020B0502020202020204" pitchFamily="34" charset="0"/>
-              </a:rPr>
-              <a:t>5.Conclusion &amp; perspectives</a:t>
-            </a:r>
-            <a:endParaRPr lang="en-US" sz="5800" b="1" dirty="0">
-              <a:solidFill>
-                <a:srgbClr val="275C8D"/>
-              </a:solidFill>
-              <a:effectLst>
-                <a:outerShdw blurRad="38100" dist="38100" dir="2700000" algn="tl">
-                  <a:srgbClr val="000000">
-                    <a:alpha val="43137"/>
-                  </a:srgbClr>
-                </a:outerShdw>
-              </a:effectLst>
-              <a:latin typeface="Century Gothic" panose="020B0502020202020204" pitchFamily="34" charset="0"/>
-            </a:endParaRPr>
-          </a:p>
-        </p:txBody>
-      </p:sp>
-      <p:sp>
-        <p:nvSpPr>
           <p:cNvPr id="7" name="Espace réservé du numéro de diapositive 6"/>
           <p:cNvSpPr>
             <a:spLocks noGrp="1"/>
@@ -22455,6 +22395,74 @@
               <a:t>27</a:t>
             </a:fld>
             <a:endParaRPr lang="en-US"/>
+          </a:p>
+        </p:txBody>
+      </p:sp>
+      <p:sp>
+        <p:nvSpPr>
+          <p:cNvPr id="3" name="Google Shape;554;p16">
+            <a:extLst>
+              <a:ext uri="{FF2B5EF4-FFF2-40B4-BE49-F238E27FC236}">
+                <a16:creationId xmlns:a16="http://schemas.microsoft.com/office/drawing/2014/main" id="{A65F65E2-BA37-EB7B-D5E7-52684C2ABDA6}"/>
+              </a:ext>
+            </a:extLst>
+          </p:cNvPr>
+          <p:cNvSpPr/>
+          <p:nvPr/>
+        </p:nvSpPr>
+        <p:spPr>
+          <a:xfrm>
+            <a:off x="0" y="1"/>
+            <a:ext cx="12191999" cy="6857999"/>
+          </a:xfrm>
+          <a:prstGeom prst="rect">
+            <a:avLst/>
+          </a:prstGeom>
+          <a:solidFill>
+            <a:srgbClr val="173F5F"/>
+          </a:solidFill>
+          <a:ln w="25400" cap="flat" cmpd="sng">
+            <a:solidFill>
+              <a:srgbClr val="173F5F"/>
+            </a:solidFill>
+            <a:prstDash val="solid"/>
+            <a:round/>
+            <a:headEnd type="none" w="sm" len="sm"/>
+            <a:tailEnd type="none" w="sm" len="sm"/>
+          </a:ln>
+        </p:spPr>
+        <p:txBody>
+          <a:bodyPr spcFirstLastPara="1" wrap="square" lIns="91425" tIns="45700" rIns="91425" bIns="45700" anchor="ctr" anchorCtr="0">
+            <a:noAutofit/>
+          </a:bodyPr>
+          <a:lstStyle/>
+          <a:p>
+            <a:pPr lvl="0" algn="ctr"/>
+            <a:r>
+              <a:rPr lang="fr-FR" sz="3200" b="1" dirty="0">
+                <a:solidFill>
+                  <a:schemeClr val="bg1"/>
+                </a:solidFill>
+                <a:effectLst>
+                  <a:outerShdw blurRad="38100" dist="38100" dir="2700000" algn="tl">
+                    <a:srgbClr val="000000">
+                      <a:alpha val="43137"/>
+                    </a:srgbClr>
+                  </a:outerShdw>
+                </a:effectLst>
+                <a:latin typeface="Century Gothic" panose="020B0502020202020204" pitchFamily="34" charset="0"/>
+              </a:rPr>
+              <a:t>5.Conclusion &amp; perspectives</a:t>
+            </a:r>
+            <a:endParaRPr sz="3000" b="0" i="0" u="none" strike="noStrike" cap="none" dirty="0">
+              <a:solidFill>
+                <a:schemeClr val="bg1"/>
+              </a:solidFill>
+              <a:latin typeface="Twentieth Century"/>
+              <a:ea typeface="Twentieth Century"/>
+              <a:cs typeface="Twentieth Century"/>
+              <a:sym typeface="Twentieth Century"/>
+            </a:endParaRPr>
           </a:p>
         </p:txBody>
       </p:sp>
@@ -22480,6 +22488,92 @@
       </p:transition>
     </mc:Fallback>
   </mc:AlternateContent>
+  <p:timing>
+    <p:tnLst>
+      <p:par>
+        <p:cTn id="1" dur="indefinite" restart="never" nodeType="tmRoot">
+          <p:childTnLst>
+            <p:seq concurrent="1" nextAc="seek">
+              <p:cTn id="2" dur="indefinite" nodeType="mainSeq">
+                <p:childTnLst>
+                  <p:par>
+                    <p:cTn id="3" fill="hold">
+                      <p:stCondLst>
+                        <p:cond delay="indefinite"/>
+                        <p:cond evt="onBegin" delay="0">
+                          <p:tn val="2"/>
+                        </p:cond>
+                      </p:stCondLst>
+                      <p:childTnLst>
+                        <p:par>
+                          <p:cTn id="4" fill="hold">
+                            <p:stCondLst>
+                              <p:cond delay="0"/>
+                            </p:stCondLst>
+                            <p:childTnLst>
+                              <p:par>
+                                <p:cTn id="5" presetID="10" presetClass="entr" presetSubtype="0" fill="hold" nodeType="withEffect">
+                                  <p:stCondLst>
+                                    <p:cond delay="0"/>
+                                  </p:stCondLst>
+                                  <p:childTnLst>
+                                    <p:set>
+                                      <p:cBhvr>
+                                        <p:cTn id="6" dur="1" fill="hold">
+                                          <p:stCondLst>
+                                            <p:cond delay="0"/>
+                                          </p:stCondLst>
+                                        </p:cTn>
+                                        <p:tgtEl>
+                                          <p:spTgt spid="3"/>
+                                        </p:tgtEl>
+                                        <p:attrNameLst>
+                                          <p:attrName>style.visibility</p:attrName>
+                                        </p:attrNameLst>
+                                      </p:cBhvr>
+                                      <p:to>
+                                        <p:strVal val="visible"/>
+                                      </p:to>
+                                    </p:set>
+                                    <p:animEffect transition="in" filter="fade">
+                                      <p:cBhvr>
+                                        <p:cTn id="7" dur="500"/>
+                                        <p:tgtEl>
+                                          <p:spTgt spid="3"/>
+                                        </p:tgtEl>
+                                      </p:cBhvr>
+                                    </p:animEffect>
+                                  </p:childTnLst>
+                                </p:cTn>
+                              </p:par>
+                            </p:childTnLst>
+                          </p:cTn>
+                        </p:par>
+                      </p:childTnLst>
+                    </p:cTn>
+                  </p:par>
+                </p:childTnLst>
+              </p:cTn>
+              <p:prevCondLst>
+                <p:cond evt="onPrev" delay="0">
+                  <p:tgtEl>
+                    <p:sldTgt/>
+                  </p:tgtEl>
+                </p:cond>
+              </p:prevCondLst>
+              <p:nextCondLst>
+                <p:cond evt="onNext" delay="0">
+                  <p:tgtEl>
+                    <p:sldTgt/>
+                  </p:tgtEl>
+                </p:cond>
+              </p:nextCondLst>
+            </p:seq>
+          </p:childTnLst>
+        </p:cTn>
+      </p:par>
+    </p:tnLst>
+  </p:timing>
 </p:sld>
 </file>
 

</xml_diff>